<commit_message>
add stock quantity model
</commit_message>
<xml_diff>
--- a/documentation/Presentation1.pptx
+++ b/documentation/Presentation1.pptx
@@ -119,6 +119,22 @@
       </a:defRPr>
     </a:lvl9pPr>
   </p:defaultTextStyle>
+  <p:extLst>
+    <p:ext uri="{EFAFB233-063F-42B5-8137-9DF3F51BA10A}">
+      <p15:sldGuideLst xmlns:p15="http://schemas.microsoft.com/office/powerpoint/2012/main">
+        <p15:guide id="1" orient="horz" pos="2160">
+          <p15:clr>
+            <a:srgbClr val="A4A3A4"/>
+          </p15:clr>
+        </p15:guide>
+        <p15:guide id="2" pos="2880">
+          <p15:clr>
+            <a:srgbClr val="A4A3A4"/>
+          </p15:clr>
+        </p15:guide>
+      </p15:sldGuideLst>
+    </p:ext>
+  </p:extLst>
 </p:presentation>
 </file>
 
@@ -3490,14 +3506,18 @@
             </a:r>
             <a:r>
               <a:rPr lang="en-US" dirty="0" smtClean="0"/>
-              <a:t> S</a:t>
-            </a:r>
-            <a:r>
-              <a:rPr lang="vi-VN" dirty="0" smtClean="0"/>
+              <a:t> </a:t>
+            </a:r>
+            <a:r>
+              <a:rPr lang="en-US" dirty="0" err="1" smtClean="0"/>
+              <a:t>S</a:t>
+            </a:r>
+            <a:r>
+              <a:rPr lang="en-US" dirty="0" err="1" smtClean="0"/>
               <a:t>ơ</a:t>
             </a:r>
             <a:r>
-              <a:rPr lang="en-US" dirty="0" smtClean="0"/>
+              <a:rPr lang="en-US" dirty="0" err="1" smtClean="0"/>
               <a:t>n</a:t>
             </a:r>
             <a:endParaRPr lang="vi-VN" dirty="0"/>

</xml_diff>